<commit_message>
added own notes during lecture
</commit_message>
<xml_diff>
--- a/01-terminal/ScienceCloud.pptx
+++ b/01-terminal/ScienceCloud.pptx
@@ -16,6 +16,7 @@
     <p:sldId id="264" r:id="rId10"/>
     <p:sldId id="266" r:id="rId11"/>
     <p:sldId id="265" r:id="rId12"/>
+    <p:sldId id="267" r:id="rId13"/>
   </p:sldIdLst>
   <p:sldSz cx="12192000" cy="6858000"/>
   <p:notesSz cx="6858000" cy="9144000"/>
@@ -114,6 +115,11 @@
       </a:defRPr>
     </a:lvl9pPr>
   </p:defaultTextStyle>
+  <p:extLst>
+    <p:ext uri="{EFAFB233-063F-42B5-8137-9DF3F51BA10A}">
+      <p15:sldGuideLst xmlns:p15="http://schemas.microsoft.com/office/powerpoint/2012/main"/>
+    </p:ext>
+  </p:extLst>
 </p:presentation>
 </file>
 
@@ -266,7 +272,7 @@
           <a:p>
             <a:fld id="{331A492B-FC9F-294F-A4AD-26E45947B24F}" type="datetimeFigureOut">
               <a:rPr lang="en-CH" smtClean="0"/>
-              <a:t>23.08.23</a:t>
+              <a:t>08/21/2024</a:t>
             </a:fld>
             <a:endParaRPr lang="en-CH"/>
           </a:p>
@@ -466,7 +472,7 @@
           <a:p>
             <a:fld id="{331A492B-FC9F-294F-A4AD-26E45947B24F}" type="datetimeFigureOut">
               <a:rPr lang="en-CH" smtClean="0"/>
-              <a:t>23.08.23</a:t>
+              <a:t>08/21/2024</a:t>
             </a:fld>
             <a:endParaRPr lang="en-CH"/>
           </a:p>
@@ -676,7 +682,7 @@
           <a:p>
             <a:fld id="{331A492B-FC9F-294F-A4AD-26E45947B24F}" type="datetimeFigureOut">
               <a:rPr lang="en-CH" smtClean="0"/>
-              <a:t>23.08.23</a:t>
+              <a:t>08/21/2024</a:t>
             </a:fld>
             <a:endParaRPr lang="en-CH"/>
           </a:p>
@@ -876,7 +882,7 @@
           <a:p>
             <a:fld id="{331A492B-FC9F-294F-A4AD-26E45947B24F}" type="datetimeFigureOut">
               <a:rPr lang="en-CH" smtClean="0"/>
-              <a:t>23.08.23</a:t>
+              <a:t>08/21/2024</a:t>
             </a:fld>
             <a:endParaRPr lang="en-CH"/>
           </a:p>
@@ -1152,7 +1158,7 @@
           <a:p>
             <a:fld id="{331A492B-FC9F-294F-A4AD-26E45947B24F}" type="datetimeFigureOut">
               <a:rPr lang="en-CH" smtClean="0"/>
-              <a:t>23.08.23</a:t>
+              <a:t>08/21/2024</a:t>
             </a:fld>
             <a:endParaRPr lang="en-CH"/>
           </a:p>
@@ -1420,7 +1426,7 @@
           <a:p>
             <a:fld id="{331A492B-FC9F-294F-A4AD-26E45947B24F}" type="datetimeFigureOut">
               <a:rPr lang="en-CH" smtClean="0"/>
-              <a:t>23.08.23</a:t>
+              <a:t>08/21/2024</a:t>
             </a:fld>
             <a:endParaRPr lang="en-CH"/>
           </a:p>
@@ -1835,7 +1841,7 @@
           <a:p>
             <a:fld id="{331A492B-FC9F-294F-A4AD-26E45947B24F}" type="datetimeFigureOut">
               <a:rPr lang="en-CH" smtClean="0"/>
-              <a:t>23.08.23</a:t>
+              <a:t>08/21/2024</a:t>
             </a:fld>
             <a:endParaRPr lang="en-CH"/>
           </a:p>
@@ -1977,7 +1983,7 @@
           <a:p>
             <a:fld id="{331A492B-FC9F-294F-A4AD-26E45947B24F}" type="datetimeFigureOut">
               <a:rPr lang="en-CH" smtClean="0"/>
-              <a:t>23.08.23</a:t>
+              <a:t>08/21/2024</a:t>
             </a:fld>
             <a:endParaRPr lang="en-CH"/>
           </a:p>
@@ -2090,7 +2096,7 @@
           <a:p>
             <a:fld id="{331A492B-FC9F-294F-A4AD-26E45947B24F}" type="datetimeFigureOut">
               <a:rPr lang="en-CH" smtClean="0"/>
-              <a:t>23.08.23</a:t>
+              <a:t>08/21/2024</a:t>
             </a:fld>
             <a:endParaRPr lang="en-CH"/>
           </a:p>
@@ -2403,7 +2409,7 @@
           <a:p>
             <a:fld id="{331A492B-FC9F-294F-A4AD-26E45947B24F}" type="datetimeFigureOut">
               <a:rPr lang="en-CH" smtClean="0"/>
-              <a:t>23.08.23</a:t>
+              <a:t>08/21/2024</a:t>
             </a:fld>
             <a:endParaRPr lang="en-CH"/>
           </a:p>
@@ -2692,7 +2698,7 @@
           <a:p>
             <a:fld id="{331A492B-FC9F-294F-A4AD-26E45947B24F}" type="datetimeFigureOut">
               <a:rPr lang="en-CH" smtClean="0"/>
-              <a:t>23.08.23</a:t>
+              <a:t>08/21/2024</a:t>
             </a:fld>
             <a:endParaRPr lang="en-CH"/>
           </a:p>
@@ -2935,7 +2941,7 @@
           <a:p>
             <a:fld id="{331A492B-FC9F-294F-A4AD-26E45947B24F}" type="datetimeFigureOut">
               <a:rPr lang="en-CH" smtClean="0"/>
-              <a:t>23.08.23</a:t>
+              <a:t>08/21/2024</a:t>
             </a:fld>
             <a:endParaRPr lang="en-CH"/>
           </a:p>
@@ -3927,6 +3933,234 @@
 </p:sld>
 </file>
 
+<file path=ppt/slides/slide12.xml><?xml version="1.0" encoding="utf-8"?>
+<p:sld xmlns:a="http://schemas.openxmlformats.org/drawingml/2006/main" xmlns:r="http://schemas.openxmlformats.org/officeDocument/2006/relationships" xmlns:p="http://schemas.openxmlformats.org/presentationml/2006/main">
+  <p:cSld>
+    <p:spTree>
+      <p:nvGrpSpPr>
+        <p:cNvPr id="1" name=""/>
+        <p:cNvGrpSpPr/>
+        <p:nvPr/>
+      </p:nvGrpSpPr>
+      <p:grpSpPr>
+        <a:xfrm>
+          <a:off x="0" y="0"/>
+          <a:ext cx="0" cy="0"/>
+          <a:chOff x="0" y="0"/>
+          <a:chExt cx="0" cy="0"/>
+        </a:xfrm>
+      </p:grpSpPr>
+      <p:sp>
+        <p:nvSpPr>
+          <p:cNvPr id="2" name="Title 1">
+            <a:extLst>
+              <a:ext uri="{FF2B5EF4-FFF2-40B4-BE49-F238E27FC236}">
+                <a16:creationId xmlns:a16="http://schemas.microsoft.com/office/drawing/2014/main" id="{5F8B5037-8EA1-66DA-C7F3-C30B19FEDB50}"/>
+              </a:ext>
+            </a:extLst>
+          </p:cNvPr>
+          <p:cNvSpPr>
+            <a:spLocks noGrp="1"/>
+          </p:cNvSpPr>
+          <p:nvPr>
+            <p:ph type="title"/>
+          </p:nvPr>
+        </p:nvSpPr>
+        <p:spPr/>
+        <p:txBody>
+          <a:bodyPr/>
+          <a:lstStyle/>
+          <a:p>
+            <a:r>
+              <a:rPr lang="en-US" dirty="0"/>
+              <a:t>Commands in the terminal I can use in ubuntu remote machine (not on Windows)</a:t>
+            </a:r>
+          </a:p>
+        </p:txBody>
+      </p:sp>
+      <p:sp>
+        <p:nvSpPr>
+          <p:cNvPr id="3" name="Content Placeholder 2">
+            <a:extLst>
+              <a:ext uri="{FF2B5EF4-FFF2-40B4-BE49-F238E27FC236}">
+                <a16:creationId xmlns:a16="http://schemas.microsoft.com/office/drawing/2014/main" id="{168C483D-8260-635B-1F08-3C9713BE04C5}"/>
+              </a:ext>
+            </a:extLst>
+          </p:cNvPr>
+          <p:cNvSpPr>
+            <a:spLocks noGrp="1"/>
+          </p:cNvSpPr>
+          <p:nvPr>
+            <p:ph idx="1"/>
+          </p:nvPr>
+        </p:nvSpPr>
+        <p:spPr/>
+        <p:txBody>
+          <a:bodyPr>
+            <a:normAutofit lnSpcReduction="10000"/>
+          </a:bodyPr>
+          <a:lstStyle/>
+          <a:p>
+            <a:pPr rtl="0"/>
+            <a:r>
+              <a:rPr lang="en-US" dirty="0">
+                <a:effectLst/>
+              </a:rPr>
+              <a:t>~ means that we </a:t>
+            </a:r>
+            <a:r>
+              <a:rPr lang="en-US" dirty="0" err="1">
+                <a:effectLst/>
+              </a:rPr>
+              <a:t>arein</a:t>
+            </a:r>
+            <a:r>
+              <a:rPr lang="en-US" dirty="0">
+                <a:effectLst/>
+              </a:rPr>
+              <a:t> the home directory.</a:t>
+            </a:r>
+          </a:p>
+          <a:p>
+            <a:pPr rtl="0"/>
+            <a:r>
+              <a:rPr lang="en-US" dirty="0">
+                <a:effectLst/>
+              </a:rPr>
+              <a:t>Type </a:t>
+            </a:r>
+            <a:r>
+              <a:rPr lang="en-US" dirty="0" err="1">
+                <a:effectLst/>
+              </a:rPr>
+              <a:t>pwd</a:t>
+            </a:r>
+            <a:r>
+              <a:rPr lang="en-US" dirty="0">
+                <a:effectLst/>
+              </a:rPr>
+              <a:t> to determine current directory.</a:t>
+            </a:r>
+          </a:p>
+          <a:p>
+            <a:pPr rtl="0"/>
+            <a:r>
+              <a:rPr lang="en-US" dirty="0"/>
+              <a:t>T</a:t>
+            </a:r>
+            <a:r>
+              <a:rPr lang="en-US" dirty="0">
+                <a:effectLst/>
+              </a:rPr>
+              <a:t>ype ls to list directories</a:t>
+            </a:r>
+          </a:p>
+          <a:p>
+            <a:pPr rtl="0"/>
+            <a:r>
+              <a:rPr lang="en-US" dirty="0">
+                <a:effectLst/>
+              </a:rPr>
+              <a:t>Type cd .. to go one level up. Type cd </a:t>
+            </a:r>
+            <a:r>
+              <a:rPr lang="en-US" dirty="0" err="1">
+                <a:effectLst/>
+              </a:rPr>
+              <a:t>foldername</a:t>
+            </a:r>
+            <a:r>
+              <a:rPr lang="en-US" dirty="0">
+                <a:effectLst/>
+              </a:rPr>
+              <a:t> to enter folder.</a:t>
+            </a:r>
+          </a:p>
+          <a:p>
+            <a:pPr rtl="0"/>
+            <a:r>
+              <a:rPr lang="en-US" dirty="0">
+                <a:effectLst/>
+              </a:rPr>
+              <a:t>Press tab for auto completion of folder names while typing</a:t>
+            </a:r>
+          </a:p>
+          <a:p>
+            <a:pPr rtl="0"/>
+            <a:r>
+              <a:rPr lang="en-US" dirty="0"/>
+              <a:t>Type </a:t>
+            </a:r>
+            <a:r>
+              <a:rPr lang="en-US" dirty="0" err="1"/>
+              <a:t>mkdri</a:t>
+            </a:r>
+            <a:r>
+              <a:rPr lang="en-US" dirty="0"/>
+              <a:t> … to make a new folder</a:t>
+            </a:r>
+          </a:p>
+          <a:p>
+            <a:pPr rtl="0"/>
+            <a:r>
+              <a:rPr lang="en-US" dirty="0">
+                <a:effectLst/>
+              </a:rPr>
+              <a:t>Type </a:t>
+            </a:r>
+            <a:r>
+              <a:rPr lang="en-US" dirty="0" err="1">
+                <a:effectLst/>
+              </a:rPr>
+              <a:t>rmdir</a:t>
+            </a:r>
+            <a:r>
+              <a:rPr lang="en-US" dirty="0">
+                <a:effectLst/>
+              </a:rPr>
+              <a:t> … to </a:t>
+            </a:r>
+            <a:r>
+              <a:rPr lang="en-US" dirty="0" err="1">
+                <a:effectLst/>
+              </a:rPr>
+              <a:t>delet</a:t>
+            </a:r>
+            <a:r>
+              <a:rPr lang="en-US" dirty="0">
+                <a:effectLst/>
+              </a:rPr>
+              <a:t> a folder</a:t>
+            </a:r>
+          </a:p>
+          <a:p>
+            <a:pPr rtl="0"/>
+            <a:r>
+              <a:rPr lang="en-US" dirty="0"/>
+              <a:t>I can press upward arrow to go through previous commands I already typed</a:t>
+            </a:r>
+            <a:endParaRPr lang="en-US" dirty="0">
+              <a:effectLst/>
+            </a:endParaRPr>
+          </a:p>
+          <a:p>
+            <a:endParaRPr lang="en-US" dirty="0"/>
+          </a:p>
+        </p:txBody>
+      </p:sp>
+    </p:spTree>
+    <p:extLst>
+      <p:ext uri="{BB962C8B-B14F-4D97-AF65-F5344CB8AC3E}">
+        <p14:creationId xmlns:p14="http://schemas.microsoft.com/office/powerpoint/2010/main" val="2259706990"/>
+      </p:ext>
+    </p:extLst>
+  </p:cSld>
+  <p:clrMapOvr>
+    <a:masterClrMapping/>
+  </p:clrMapOvr>
+</p:sld>
+</file>
+
 <file path=ppt/slides/slide2.xml><?xml version="1.0" encoding="utf-8"?>
 <p:sld xmlns:a="http://schemas.openxmlformats.org/drawingml/2006/main" xmlns:r="http://schemas.openxmlformats.org/officeDocument/2006/relationships" xmlns:p="http://schemas.openxmlformats.org/presentationml/2006/main">
   <p:cSld>

</xml_diff>